<commit_message>
Updated the research paper link
</commit_message>
<xml_diff>
--- a/Hack For SAFE.pptx
+++ b/Hack For SAFE.pptx
@@ -24833,15 +24833,14 @@
               <a:t>Link: </a:t>
             </a:r>
             <a:r>
-              <a:rPr lang="en-IN" sz="1600" b="0" i="0" u="none" strike="noStrike" dirty="0">
+              <a:rPr lang="en-IN" sz="1600" dirty="0">
                 <a:solidFill>
                   <a:srgbClr val="0078D4"/>
                 </a:solidFill>
-                <a:effectLst/>
                 <a:latin typeface="Segoe UI Web (West European)"/>
                 <a:hlinkClick r:id="rId2"/>
               </a:rPr>
-              <a:t>https://github.com/RinitaSarkar/CyberSHE</a:t>
+              <a:t>Research Paper</a:t>
             </a:r>
             <a:endParaRPr lang="en-IN" sz="1600" dirty="0"/>
           </a:p>
@@ -25648,6 +25647,23 @@
 </file>
 
 <file path=customXml/item1.xml><?xml version="1.0" encoding="utf-8"?>
+<p:properties xmlns:p="http://schemas.microsoft.com/office/2006/metadata/properties" xmlns:xsi="http://www.w3.org/2001/XMLSchema-instance" xmlns:pc="http://schemas.microsoft.com/office/infopath/2007/PartnerControls">
+  <documentManagement>
+    <MediaServiceKeyPoints xmlns="71af3243-3dd4-4a8d-8c0d-dd76da1f02a5" xsi:nil="true"/>
+  </documentManagement>
+</p:properties>
+</file>
+
+<file path=customXml/item2.xml><?xml version="1.0" encoding="utf-8"?>
+<?mso-contentType ?>
+<FormTemplates xmlns="http://schemas.microsoft.com/sharepoint/v3/contenttype/forms">
+  <Display>DocumentLibraryForm</Display>
+  <Edit>DocumentLibraryForm</Edit>
+  <New>DocumentLibraryForm</New>
+</FormTemplates>
+</file>
+
+<file path=customXml/item3.xml><?xml version="1.0" encoding="utf-8"?>
 <ct:contentTypeSchema xmlns:ct="http://schemas.microsoft.com/office/2006/metadata/contentType" xmlns:ma="http://schemas.microsoft.com/office/2006/metadata/properties/metaAttributes" ct:_="" ma:_="" ma:contentTypeName="Document" ma:contentTypeID="0x01010079F111ED35F8CC479449609E8A0923A6" ma:contentTypeVersion="10" ma:contentTypeDescription="Create a new document." ma:contentTypeScope="" ma:versionID="e39e7e9e36de66d473ce04bb4ab2dbb8">
   <xsd:schema xmlns:xsd="http://www.w3.org/2001/XMLSchema" xmlns:xs="http://www.w3.org/2001/XMLSchema" xmlns:p="http://schemas.microsoft.com/office/2006/metadata/properties" xmlns:ns2="71af3243-3dd4-4a8d-8c0d-dd76da1f02a5" xmlns:ns3="16c05727-aa75-4e4a-9b5f-8a80a1165891" targetNamespace="http://schemas.microsoft.com/office/2006/metadata/properties" ma:root="true" ma:fieldsID="19dc5994665da46609c24125788630d8" ns2:_="" ns3:_="">
     <xsd:import namespace="71af3243-3dd4-4a8d-8c0d-dd76da1f02a5"/>
@@ -25852,24 +25868,32 @@
 </ct:contentTypeSchema>
 </file>
 
-<file path=customXml/item2.xml><?xml version="1.0" encoding="utf-8"?>
-<?mso-contentType ?>
-<FormTemplates xmlns="http://schemas.microsoft.com/sharepoint/v3/contenttype/forms">
-  <Display>DocumentLibraryForm</Display>
-  <Edit>DocumentLibraryForm</Edit>
-  <New>DocumentLibraryForm</New>
-</FormTemplates>
+<file path=customXml/itemProps1.xml><?xml version="1.0" encoding="utf-8"?>
+<ds:datastoreItem xmlns:ds="http://schemas.openxmlformats.org/officeDocument/2006/customXml" ds:itemID="{2519797F-2510-4681-A59B-FCD8F3733FE0}">
+  <ds:schemaRefs>
+    <ds:schemaRef ds:uri="http://purl.org/dc/dcmitype/"/>
+    <ds:schemaRef ds:uri="http://schemas.microsoft.com/office/2006/metadata/properties"/>
+    <ds:schemaRef ds:uri="http://schemas.microsoft.com/office/infopath/2007/PartnerControls"/>
+    <ds:schemaRef ds:uri="http://www.w3.org/XML/1998/namespace"/>
+    <ds:schemaRef ds:uri="http://purl.org/dc/elements/1.1/"/>
+    <ds:schemaRef ds:uri="http://schemas.microsoft.com/office/2006/documentManagement/types"/>
+    <ds:schemaRef ds:uri="16c05727-aa75-4e4a-9b5f-8a80a1165891"/>
+    <ds:schemaRef ds:uri="http://schemas.openxmlformats.org/package/2006/metadata/core-properties"/>
+    <ds:schemaRef ds:uri="71af3243-3dd4-4a8d-8c0d-dd76da1f02a5"/>
+    <ds:schemaRef ds:uri="http://purl.org/dc/terms/"/>
+  </ds:schemaRefs>
+</ds:datastoreItem>
 </file>
 
-<file path=customXml/item3.xml><?xml version="1.0" encoding="utf-8"?>
-<p:properties xmlns:p="http://schemas.microsoft.com/office/2006/metadata/properties" xmlns:xsi="http://www.w3.org/2001/XMLSchema-instance" xmlns:pc="http://schemas.microsoft.com/office/infopath/2007/PartnerControls">
-  <documentManagement>
-    <MediaServiceKeyPoints xmlns="71af3243-3dd4-4a8d-8c0d-dd76da1f02a5" xsi:nil="true"/>
-  </documentManagement>
-</p:properties>
+<file path=customXml/itemProps2.xml><?xml version="1.0" encoding="utf-8"?>
+<ds:datastoreItem xmlns:ds="http://schemas.openxmlformats.org/officeDocument/2006/customXml" ds:itemID="{A4C31332-3081-4BD9-AD6F-078B4521F357}">
+  <ds:schemaRefs>
+    <ds:schemaRef ds:uri="http://schemas.microsoft.com/sharepoint/v3/contenttype/forms"/>
+  </ds:schemaRefs>
+</ds:datastoreItem>
 </file>
 
-<file path=customXml/itemProps1.xml><?xml version="1.0" encoding="utf-8"?>
+<file path=customXml/itemProps3.xml><?xml version="1.0" encoding="utf-8"?>
 <ds:datastoreItem xmlns:ds="http://schemas.openxmlformats.org/officeDocument/2006/customXml" ds:itemID="{1FF4E1AF-DB5E-4764-961C-6F82B33E9E6E}">
   <ds:schemaRefs>
     <ds:schemaRef ds:uri="http://schemas.microsoft.com/office/2006/metadata/contentType"/>
@@ -25888,31 +25912,6 @@
 </ds:datastoreItem>
 </file>
 
-<file path=customXml/itemProps2.xml><?xml version="1.0" encoding="utf-8"?>
-<ds:datastoreItem xmlns:ds="http://schemas.openxmlformats.org/officeDocument/2006/customXml" ds:itemID="{A4C31332-3081-4BD9-AD6F-078B4521F357}">
-  <ds:schemaRefs>
-    <ds:schemaRef ds:uri="http://schemas.microsoft.com/sharepoint/v3/contenttype/forms"/>
-  </ds:schemaRefs>
-</ds:datastoreItem>
-</file>
-
-<file path=customXml/itemProps3.xml><?xml version="1.0" encoding="utf-8"?>
-<ds:datastoreItem xmlns:ds="http://schemas.openxmlformats.org/officeDocument/2006/customXml" ds:itemID="{2519797F-2510-4681-A59B-FCD8F3733FE0}">
-  <ds:schemaRefs>
-    <ds:schemaRef ds:uri="http://purl.org/dc/dcmitype/"/>
-    <ds:schemaRef ds:uri="http://schemas.microsoft.com/office/2006/metadata/properties"/>
-    <ds:schemaRef ds:uri="http://schemas.microsoft.com/office/infopath/2007/PartnerControls"/>
-    <ds:schemaRef ds:uri="http://www.w3.org/XML/1998/namespace"/>
-    <ds:schemaRef ds:uri="http://purl.org/dc/elements/1.1/"/>
-    <ds:schemaRef ds:uri="http://schemas.microsoft.com/office/2006/documentManagement/types"/>
-    <ds:schemaRef ds:uri="16c05727-aa75-4e4a-9b5f-8a80a1165891"/>
-    <ds:schemaRef ds:uri="http://schemas.openxmlformats.org/package/2006/metadata/core-properties"/>
-    <ds:schemaRef ds:uri="71af3243-3dd4-4a8d-8c0d-dd76da1f02a5"/>
-    <ds:schemaRef ds:uri="http://purl.org/dc/terms/"/>
-  </ds:schemaRefs>
-</ds:datastoreItem>
-</file>
-
 <file path=docMetadata/LabelInfo.xml><?xml version="1.0" encoding="utf-8"?>
 <clbl:labelList xmlns:clbl="http://schemas.microsoft.com/office/2020/mipLabelMetadata">
   <clbl:label id="{f42aa342-8706-4288-bd11-ebb85995028c}" enabled="1" method="Standard" siteId="{72f988bf-86f1-41af-91ab-2d7cd011db47}" contentBits="0" removed="0"/>

</xml_diff>

<commit_message>
Changed properties of the ppt
</commit_message>
<xml_diff>
--- a/Hack For SAFE.pptx
+++ b/Hack For SAFE.pptx
@@ -232,7 +232,7 @@
             <a:pPr rtl="0"/>
             <a:fld id="{5B439651-5657-4ACE-8526-EB0EAFD83944}" type="datetime1">
               <a:rPr lang="en-GB" smtClean="0"/>
-              <a:t>18/09/2023</a:t>
+              <a:t>21/09/2023</a:t>
             </a:fld>
             <a:endParaRPr lang="en-GB"/>
           </a:p>
@@ -402,7 +402,7 @@
             <a:pPr rtl="0"/>
             <a:fld id="{90CA1872-591F-4558-AB14-AA939DCFAB16}" type="datetime1">
               <a:rPr lang="en-GB" noProof="0" smtClean="0"/>
-              <a:t>18/09/2023</a:t>
+              <a:t>21/09/2023</a:t>
             </a:fld>
             <a:endParaRPr lang="en-GB" noProof="0"/>
           </a:p>
@@ -15660,7 +15660,7 @@
             <a:pPr rtl="0"/>
             <a:fld id="{59B8D6E1-39C9-4C44-91D8-BAEE9FF6D549}" type="datetime1">
               <a:rPr lang="en-GB" noProof="0" smtClean="0"/>
-              <a:t>18/09/2023</a:t>
+              <a:t>21/09/2023</a:t>
             </a:fld>
             <a:endParaRPr lang="en-GB" noProof="0"/>
           </a:p>
@@ -16396,6 +16396,21 @@
   <p:clrMapOvr>
     <a:masterClrMapping/>
   </p:clrMapOvr>
+  <mc:AlternateContent xmlns:mc="http://schemas.openxmlformats.org/markup-compatibility/2006" xmlns:p14="http://schemas.microsoft.com/office/powerpoint/2010/main">
+    <mc:Choice Requires="p14">
+      <p:transition spd="slow" p14:dur="2000" advTm="6442"/>
+    </mc:Choice>
+    <mc:Fallback xmlns="">
+      <p:transition spd="slow" advTm="6442"/>
+    </mc:Fallback>
+  </mc:AlternateContent>
+  <p:extLst>
+    <p:ext uri="{E180D4A7-C9FB-4DFB-919C-405C955672EB}">
+      <p14:showEvtLst xmlns:p14="http://schemas.microsoft.com/office/powerpoint/2010/main">
+        <p14:playEvt time="494" objId="5"/>
+      </p14:showEvtLst>
+    </p:ext>
+  </p:extLst>
 </p:sld>
 </file>
 
@@ -16434,8 +16449,8 @@
         </p:nvSpPr>
         <p:spPr>
           <a:xfrm>
-            <a:off x="11363696" y="6455739"/>
-            <a:ext cx="294460" cy="187367"/>
+            <a:off x="11363696" y="6455740"/>
+            <a:ext cx="391424" cy="155640"/>
           </a:xfrm>
         </p:spPr>
         <p:txBody>
@@ -16456,7 +16471,7 @@
               </a:pPr>
               <a:t>10</a:t>
             </a:fld>
-            <a:endParaRPr lang="en-GB" noProof="0"/>
+            <a:endParaRPr lang="en-GB" noProof="0" dirty="0"/>
           </a:p>
         </p:txBody>
       </p:sp>
@@ -19311,6 +19326,14 @@
   <p:clrMapOvr>
     <a:masterClrMapping/>
   </p:clrMapOvr>
+  <mc:AlternateContent xmlns:mc="http://schemas.openxmlformats.org/markup-compatibility/2006" xmlns:p14="http://schemas.microsoft.com/office/powerpoint/2010/main">
+    <mc:Choice Requires="p14">
+      <p:transition spd="slow" p14:dur="2000" advTm="10290"/>
+    </mc:Choice>
+    <mc:Fallback xmlns="">
+      <p:transition spd="slow" advTm="10290"/>
+    </mc:Fallback>
+  </mc:AlternateContent>
 </p:sld>
 </file>
 
@@ -19480,6 +19503,14 @@
   <p:clrMapOvr>
     <a:masterClrMapping/>
   </p:clrMapOvr>
+  <mc:AlternateContent xmlns:mc="http://schemas.openxmlformats.org/markup-compatibility/2006" xmlns:p14="http://schemas.microsoft.com/office/powerpoint/2010/main">
+    <mc:Choice Requires="p14">
+      <p:transition spd="slow" p14:dur="2000" advTm="6345"/>
+    </mc:Choice>
+    <mc:Fallback xmlns="">
+      <p:transition spd="slow" advTm="6345"/>
+    </mc:Fallback>
+  </mc:AlternateContent>
 </p:sld>
 </file>
 
@@ -19920,6 +19951,14 @@
   <p:clrMapOvr>
     <a:masterClrMapping/>
   </p:clrMapOvr>
+  <mc:AlternateContent xmlns:mc="http://schemas.openxmlformats.org/markup-compatibility/2006" xmlns:p14="http://schemas.microsoft.com/office/powerpoint/2010/main">
+    <mc:Choice Requires="p14">
+      <p:transition spd="slow" p14:dur="2000" advTm="10374"/>
+    </mc:Choice>
+    <mc:Fallback xmlns="">
+      <p:transition spd="slow" advTm="10374"/>
+    </mc:Fallback>
+  </mc:AlternateContent>
 </p:sld>
 </file>
 
@@ -22449,6 +22488,14 @@
   <p:clrMapOvr>
     <a:masterClrMapping/>
   </p:clrMapOvr>
+  <mc:AlternateContent xmlns:mc="http://schemas.openxmlformats.org/markup-compatibility/2006" xmlns:p14="http://schemas.microsoft.com/office/powerpoint/2010/main">
+    <mc:Choice Requires="p14">
+      <p:transition spd="slow" p14:dur="2000" advTm="10652"/>
+    </mc:Choice>
+    <mc:Fallback xmlns="">
+      <p:transition spd="slow" advTm="10652"/>
+    </mc:Fallback>
+  </mc:AlternateContent>
 </p:sld>
 </file>
 
@@ -22889,6 +22936,14 @@
   <p:clrMapOvr>
     <a:masterClrMapping/>
   </p:clrMapOvr>
+  <mc:AlternateContent xmlns:mc="http://schemas.openxmlformats.org/markup-compatibility/2006" xmlns:p14="http://schemas.microsoft.com/office/powerpoint/2010/main">
+    <mc:Choice Requires="p14">
+      <p:transition spd="slow" p14:dur="2000" advTm="10091"/>
+    </mc:Choice>
+    <mc:Fallback xmlns="">
+      <p:transition spd="slow" advTm="10091"/>
+    </mc:Fallback>
+  </mc:AlternateContent>
 </p:sld>
 </file>
 
@@ -23836,6 +23891,14 @@
   <p:clrMapOvr>
     <a:masterClrMapping/>
   </p:clrMapOvr>
+  <mc:AlternateContent xmlns:mc="http://schemas.openxmlformats.org/markup-compatibility/2006" xmlns:p14="http://schemas.microsoft.com/office/powerpoint/2010/main">
+    <mc:Choice Requires="p14">
+      <p:transition spd="slow" p14:dur="2000" advTm="12100"/>
+    </mc:Choice>
+    <mc:Fallback xmlns="">
+      <p:transition spd="slow" advTm="12100"/>
+    </mc:Fallback>
+  </mc:AlternateContent>
 </p:sld>
 </file>
 
@@ -24105,6 +24168,14 @@
   <p:clrMapOvr>
     <a:masterClrMapping/>
   </p:clrMapOvr>
+  <mc:AlternateContent xmlns:mc="http://schemas.openxmlformats.org/markup-compatibility/2006" xmlns:p14="http://schemas.microsoft.com/office/powerpoint/2010/main">
+    <mc:Choice Requires="p14">
+      <p:transition spd="slow" p14:dur="2000" advTm="7887"/>
+    </mc:Choice>
+    <mc:Fallback xmlns="">
+      <p:transition spd="slow" advTm="7887"/>
+    </mc:Fallback>
+  </mc:AlternateContent>
 </p:sld>
 </file>
 
@@ -24426,6 +24497,14 @@
   <p:clrMapOvr>
     <a:masterClrMapping/>
   </p:clrMapOvr>
+  <mc:AlternateContent xmlns:mc="http://schemas.openxmlformats.org/markup-compatibility/2006" xmlns:p14="http://schemas.microsoft.com/office/powerpoint/2010/main">
+    <mc:Choice Requires="p14">
+      <p:transition spd="slow" p14:dur="2000" advTm="7277"/>
+    </mc:Choice>
+    <mc:Fallback xmlns="">
+      <p:transition spd="slow" advTm="7277"/>
+    </mc:Fallback>
+  </mc:AlternateContent>
 </p:sld>
 </file>
 
@@ -24730,6 +24809,14 @@
   <p:clrMapOvr>
     <a:masterClrMapping/>
   </p:clrMapOvr>
+  <mc:AlternateContent xmlns:mc="http://schemas.openxmlformats.org/markup-compatibility/2006" xmlns:p14="http://schemas.microsoft.com/office/powerpoint/2010/main">
+    <mc:Choice Requires="p14">
+      <p:transition spd="slow" p14:dur="2000" advTm="8048"/>
+    </mc:Choice>
+    <mc:Fallback xmlns="">
+      <p:transition spd="slow" advTm="8048"/>
+    </mc:Fallback>
+  </mc:AlternateContent>
 </p:sld>
 </file>
 
@@ -24886,6 +24973,14 @@
   <p:clrMapOvr>
     <a:masterClrMapping/>
   </p:clrMapOvr>
+  <mc:AlternateContent xmlns:mc="http://schemas.openxmlformats.org/markup-compatibility/2006" xmlns:p14="http://schemas.microsoft.com/office/powerpoint/2010/main">
+    <mc:Choice Requires="p14">
+      <p:transition spd="slow" p14:dur="2000" advTm="7803"/>
+    </mc:Choice>
+    <mc:Fallback xmlns="">
+      <p:transition spd="slow" advTm="7803"/>
+    </mc:Fallback>
+  </mc:AlternateContent>
 </p:sld>
 </file>
 
@@ -25872,13 +25967,13 @@
 <ds:datastoreItem xmlns:ds="http://schemas.openxmlformats.org/officeDocument/2006/customXml" ds:itemID="{2519797F-2510-4681-A59B-FCD8F3733FE0}">
   <ds:schemaRefs>
     <ds:schemaRef ds:uri="http://purl.org/dc/dcmitype/"/>
+    <ds:schemaRef ds:uri="http://purl.org/dc/elements/1.1/"/>
+    <ds:schemaRef ds:uri="http://www.w3.org/XML/1998/namespace"/>
+    <ds:schemaRef ds:uri="http://schemas.openxmlformats.org/package/2006/metadata/core-properties"/>
+    <ds:schemaRef ds:uri="http://schemas.microsoft.com/office/2006/documentManagement/types"/>
+    <ds:schemaRef ds:uri="16c05727-aa75-4e4a-9b5f-8a80a1165891"/>
     <ds:schemaRef ds:uri="http://schemas.microsoft.com/office/2006/metadata/properties"/>
     <ds:schemaRef ds:uri="http://schemas.microsoft.com/office/infopath/2007/PartnerControls"/>
-    <ds:schemaRef ds:uri="http://www.w3.org/XML/1998/namespace"/>
-    <ds:schemaRef ds:uri="http://purl.org/dc/elements/1.1/"/>
-    <ds:schemaRef ds:uri="http://schemas.microsoft.com/office/2006/documentManagement/types"/>
-    <ds:schemaRef ds:uri="16c05727-aa75-4e4a-9b5f-8a80a1165891"/>
-    <ds:schemaRef ds:uri="http://schemas.openxmlformats.org/package/2006/metadata/core-properties"/>
     <ds:schemaRef ds:uri="71af3243-3dd4-4a8d-8c0d-dd76da1f02a5"/>
     <ds:schemaRef ds:uri="http://purl.org/dc/terms/"/>
   </ds:schemaRefs>

</xml_diff>